<commit_message>
Update to PowerPoint Presentation.
</commit_message>
<xml_diff>
--- a/ML Classification Presentation.pptx
+++ b/ML Classification Presentation.pptx
@@ -3842,6 +3842,13 @@
         </dgm:presLayoutVars>
       </dgm:prSet>
       <dgm:spPr/>
+      <dgm:t>
+        <a:bodyPr/>
+        <a:lstStyle/>
+        <a:p>
+          <a:endParaRPr lang="en-US"/>
+        </a:p>
+      </dgm:t>
     </dgm:pt>
     <dgm:pt modelId="{C873A5DF-3942-4673-BA1E-21381E9CEC6B}" type="pres">
       <dgm:prSet presAssocID="{B04C94E3-E435-4D6C-8F9A-D334BB151AEF}" presName="parTxOnlySpace" presStyleCnt="0"/>
@@ -3856,6 +3863,13 @@
         </dgm:presLayoutVars>
       </dgm:prSet>
       <dgm:spPr/>
+      <dgm:t>
+        <a:bodyPr/>
+        <a:lstStyle/>
+        <a:p>
+          <a:endParaRPr lang="en-US"/>
+        </a:p>
+      </dgm:t>
     </dgm:pt>
     <dgm:pt modelId="{ACBA2C6E-1253-4A6C-88C0-62917408DD69}" type="pres">
       <dgm:prSet presAssocID="{8D818D26-F4A8-4A79-B93E-486FDA5DD48A}" presName="parTxOnlySpace" presStyleCnt="0"/>
@@ -3870,6 +3884,13 @@
         </dgm:presLayoutVars>
       </dgm:prSet>
       <dgm:spPr/>
+      <dgm:t>
+        <a:bodyPr/>
+        <a:lstStyle/>
+        <a:p>
+          <a:endParaRPr lang="en-US"/>
+        </a:p>
+      </dgm:t>
     </dgm:pt>
     <dgm:pt modelId="{507829FF-0377-41EF-9142-44EEDFA6DB6B}" type="pres">
       <dgm:prSet presAssocID="{90084047-6BBE-486E-95AD-4439173A0695}" presName="parTxOnlySpace" presStyleCnt="0"/>
@@ -3905,6 +3926,13 @@
         </dgm:presLayoutVars>
       </dgm:prSet>
       <dgm:spPr/>
+      <dgm:t>
+        <a:bodyPr/>
+        <a:lstStyle/>
+        <a:p>
+          <a:endParaRPr lang="en-US"/>
+        </a:p>
+      </dgm:t>
     </dgm:pt>
     <dgm:pt modelId="{DC680E3C-717B-44D3-8FE9-A211AC81719E}" type="pres">
       <dgm:prSet presAssocID="{2A18CA7E-955E-4616-A724-9E418C9BCA45}" presName="parTxOnlySpace" presStyleCnt="0"/>
@@ -4169,6 +4197,13 @@
         </dgm:presLayoutVars>
       </dgm:prSet>
       <dgm:spPr/>
+      <dgm:t>
+        <a:bodyPr/>
+        <a:lstStyle/>
+        <a:p>
+          <a:endParaRPr lang="en-US"/>
+        </a:p>
+      </dgm:t>
     </dgm:pt>
     <dgm:pt modelId="{FC1844E1-07DC-4186-B45B-CB95284719E1}" type="pres">
       <dgm:prSet presAssocID="{680A8507-759C-489C-A702-A5BDFCC16EB9}" presName="parTxOnlySpace" presStyleCnt="0"/>
@@ -4204,6 +4239,13 @@
         </dgm:presLayoutVars>
       </dgm:prSet>
       <dgm:spPr/>
+      <dgm:t>
+        <a:bodyPr/>
+        <a:lstStyle/>
+        <a:p>
+          <a:endParaRPr lang="en-US"/>
+        </a:p>
+      </dgm:t>
     </dgm:pt>
   </dgm:ptLst>
   <dgm:cxnLst>
@@ -4396,6 +4438,13 @@
         </dgm:presLayoutVars>
       </dgm:prSet>
       <dgm:spPr/>
+      <dgm:t>
+        <a:bodyPr/>
+        <a:lstStyle/>
+        <a:p>
+          <a:endParaRPr lang="en-US"/>
+        </a:p>
+      </dgm:t>
     </dgm:pt>
     <dgm:pt modelId="{529A7C94-E7D9-4E48-AAC4-D0B7F930C7FE}" type="pres">
       <dgm:prSet presAssocID="{B88792D8-D712-40A7-A01D-408A71AF5FF7}" presName="dummyMaxCanvas" presStyleCnt="0">
@@ -4410,6 +4459,13 @@
         </dgm:presLayoutVars>
       </dgm:prSet>
       <dgm:spPr/>
+      <dgm:t>
+        <a:bodyPr/>
+        <a:lstStyle/>
+        <a:p>
+          <a:endParaRPr lang="en-US"/>
+        </a:p>
+      </dgm:t>
     </dgm:pt>
     <dgm:pt modelId="{C426A9FE-C2B8-4270-A6AA-B0F2353DA086}" type="pres">
       <dgm:prSet presAssocID="{B88792D8-D712-40A7-A01D-408A71AF5FF7}" presName="FourNodes_2" presStyleLbl="node1" presStyleIdx="1" presStyleCnt="4">
@@ -4418,6 +4474,13 @@
         </dgm:presLayoutVars>
       </dgm:prSet>
       <dgm:spPr/>
+      <dgm:t>
+        <a:bodyPr/>
+        <a:lstStyle/>
+        <a:p>
+          <a:endParaRPr lang="en-US"/>
+        </a:p>
+      </dgm:t>
     </dgm:pt>
     <dgm:pt modelId="{8C267F8C-4BE5-4161-A021-BBE9323435CA}" type="pres">
       <dgm:prSet presAssocID="{B88792D8-D712-40A7-A01D-408A71AF5FF7}" presName="FourNodes_3" presStyleLbl="node1" presStyleIdx="2" presStyleCnt="4">
@@ -4426,6 +4489,13 @@
         </dgm:presLayoutVars>
       </dgm:prSet>
       <dgm:spPr/>
+      <dgm:t>
+        <a:bodyPr/>
+        <a:lstStyle/>
+        <a:p>
+          <a:endParaRPr lang="en-US"/>
+        </a:p>
+      </dgm:t>
     </dgm:pt>
     <dgm:pt modelId="{57AB5A0B-A90F-4138-878C-5261B61BE6CB}" type="pres">
       <dgm:prSet presAssocID="{B88792D8-D712-40A7-A01D-408A71AF5FF7}" presName="FourNodes_4" presStyleLbl="node1" presStyleIdx="3" presStyleCnt="4">
@@ -4434,6 +4504,13 @@
         </dgm:presLayoutVars>
       </dgm:prSet>
       <dgm:spPr/>
+      <dgm:t>
+        <a:bodyPr/>
+        <a:lstStyle/>
+        <a:p>
+          <a:endParaRPr lang="en-US"/>
+        </a:p>
+      </dgm:t>
     </dgm:pt>
     <dgm:pt modelId="{83712688-FFC8-4A13-82E4-49DA5C155104}" type="pres">
       <dgm:prSet presAssocID="{B88792D8-D712-40A7-A01D-408A71AF5FF7}" presName="FourConn_1-2" presStyleLbl="fgAccFollowNode1" presStyleIdx="0" presStyleCnt="3">
@@ -4442,6 +4519,13 @@
         </dgm:presLayoutVars>
       </dgm:prSet>
       <dgm:spPr/>
+      <dgm:t>
+        <a:bodyPr/>
+        <a:lstStyle/>
+        <a:p>
+          <a:endParaRPr lang="en-US"/>
+        </a:p>
+      </dgm:t>
     </dgm:pt>
     <dgm:pt modelId="{5A282F55-5C46-41ED-B3DE-5FBD8D21CC81}" type="pres">
       <dgm:prSet presAssocID="{B88792D8-D712-40A7-A01D-408A71AF5FF7}" presName="FourConn_2-3" presStyleLbl="fgAccFollowNode1" presStyleIdx="1" presStyleCnt="3">
@@ -4450,6 +4534,13 @@
         </dgm:presLayoutVars>
       </dgm:prSet>
       <dgm:spPr/>
+      <dgm:t>
+        <a:bodyPr/>
+        <a:lstStyle/>
+        <a:p>
+          <a:endParaRPr lang="en-US"/>
+        </a:p>
+      </dgm:t>
     </dgm:pt>
     <dgm:pt modelId="{6B2D69F7-A564-4150-BBFF-09440E365314}" type="pres">
       <dgm:prSet presAssocID="{B88792D8-D712-40A7-A01D-408A71AF5FF7}" presName="FourConn_3-4" presStyleLbl="fgAccFollowNode1" presStyleIdx="2" presStyleCnt="3">
@@ -4458,6 +4549,13 @@
         </dgm:presLayoutVars>
       </dgm:prSet>
       <dgm:spPr/>
+      <dgm:t>
+        <a:bodyPr/>
+        <a:lstStyle/>
+        <a:p>
+          <a:endParaRPr lang="en-US"/>
+        </a:p>
+      </dgm:t>
     </dgm:pt>
     <dgm:pt modelId="{A3E9B529-827E-4283-8B5C-6588784E1908}" type="pres">
       <dgm:prSet presAssocID="{B88792D8-D712-40A7-A01D-408A71AF5FF7}" presName="FourNodes_1_text" presStyleLbl="node1" presStyleIdx="3" presStyleCnt="4">
@@ -4466,6 +4564,13 @@
         </dgm:presLayoutVars>
       </dgm:prSet>
       <dgm:spPr/>
+      <dgm:t>
+        <a:bodyPr/>
+        <a:lstStyle/>
+        <a:p>
+          <a:endParaRPr lang="en-US"/>
+        </a:p>
+      </dgm:t>
     </dgm:pt>
     <dgm:pt modelId="{C118DA0C-BA8F-41E7-B8ED-21969112C2F8}" type="pres">
       <dgm:prSet presAssocID="{B88792D8-D712-40A7-A01D-408A71AF5FF7}" presName="FourNodes_2_text" presStyleLbl="node1" presStyleIdx="3" presStyleCnt="4">
@@ -4474,6 +4579,13 @@
         </dgm:presLayoutVars>
       </dgm:prSet>
       <dgm:spPr/>
+      <dgm:t>
+        <a:bodyPr/>
+        <a:lstStyle/>
+        <a:p>
+          <a:endParaRPr lang="en-US"/>
+        </a:p>
+      </dgm:t>
     </dgm:pt>
     <dgm:pt modelId="{333B02AC-ED89-4FA0-820B-CA93ECB21864}" type="pres">
       <dgm:prSet presAssocID="{B88792D8-D712-40A7-A01D-408A71AF5FF7}" presName="FourNodes_3_text" presStyleLbl="node1" presStyleIdx="3" presStyleCnt="4">
@@ -4482,6 +4594,13 @@
         </dgm:presLayoutVars>
       </dgm:prSet>
       <dgm:spPr/>
+      <dgm:t>
+        <a:bodyPr/>
+        <a:lstStyle/>
+        <a:p>
+          <a:endParaRPr lang="en-US"/>
+        </a:p>
+      </dgm:t>
     </dgm:pt>
     <dgm:pt modelId="{0E6A8271-65D0-4356-885C-BB82B18CC538}" type="pres">
       <dgm:prSet presAssocID="{B88792D8-D712-40A7-A01D-408A71AF5FF7}" presName="FourNodes_4_text" presStyleLbl="node1" presStyleIdx="3" presStyleCnt="4">
@@ -4490,25 +4609,32 @@
         </dgm:presLayoutVars>
       </dgm:prSet>
       <dgm:spPr/>
+      <dgm:t>
+        <a:bodyPr/>
+        <a:lstStyle/>
+        <a:p>
+          <a:endParaRPr lang="en-US"/>
+        </a:p>
+      </dgm:t>
     </dgm:pt>
   </dgm:ptLst>
   <dgm:cxnLst>
+    <dgm:cxn modelId="{F452DCD4-56D1-44CB-948D-37BD667F7614}" type="presOf" srcId="{1C883D6A-5196-4537-875B-6756E1889799}" destId="{5A282F55-5C46-41ED-B3DE-5FBD8D21CC81}" srcOrd="0" destOrd="0" presId="urn:microsoft.com/office/officeart/2005/8/layout/vProcess5"/>
+    <dgm:cxn modelId="{1ECB982F-E1C8-4EAF-9B7E-0443461FB97D}" srcId="{B88792D8-D712-40A7-A01D-408A71AF5FF7}" destId="{73AF2F64-EC1F-4D46-A6E7-57C799028966}" srcOrd="1" destOrd="0" parTransId="{1AE36609-BE59-45D0-BC24-675CCC216EA8}" sibTransId="{1C883D6A-5196-4537-875B-6756E1889799}"/>
+    <dgm:cxn modelId="{70559E97-0754-49B8-A64D-2A0199034E2D}" srcId="{B88792D8-D712-40A7-A01D-408A71AF5FF7}" destId="{F58A869B-8F8C-4843-B632-03F725FCA3E8}" srcOrd="3" destOrd="0" parTransId="{6DAAB895-D3D4-473F-8C79-E680D8D3D636}" sibTransId="{B4FF90E3-B32B-4DFA-B86B-409EA75DB306}"/>
+    <dgm:cxn modelId="{3798C650-941A-444C-AC3F-4C71E75ED66D}" srcId="{B88792D8-D712-40A7-A01D-408A71AF5FF7}" destId="{E0087C74-CE70-48EC-8808-62858B9B9113}" srcOrd="2" destOrd="0" parTransId="{ED315333-0BC9-4889-8237-4B2B2091A493}" sibTransId="{1FC7025F-3035-4C50-902C-309F7D7E2063}"/>
     <dgm:cxn modelId="{6A2C881C-0CF5-4177-B13F-D9589FB5A322}" type="presOf" srcId="{73AF2F64-EC1F-4D46-A6E7-57C799028966}" destId="{C118DA0C-BA8F-41E7-B8ED-21969112C2F8}" srcOrd="1" destOrd="0" presId="urn:microsoft.com/office/officeart/2005/8/layout/vProcess5"/>
+    <dgm:cxn modelId="{491A86F4-09B3-44D7-BC9F-C7867939E228}" type="presOf" srcId="{F58A869B-8F8C-4843-B632-03F725FCA3E8}" destId="{57AB5A0B-A90F-4138-878C-5261B61BE6CB}" srcOrd="0" destOrd="0" presId="urn:microsoft.com/office/officeart/2005/8/layout/vProcess5"/>
+    <dgm:cxn modelId="{A0027784-114A-4595-B77C-3691776079E6}" type="presOf" srcId="{73AF2F64-EC1F-4D46-A6E7-57C799028966}" destId="{C426A9FE-C2B8-4270-A6AA-B0F2353DA086}" srcOrd="0" destOrd="0" presId="urn:microsoft.com/office/officeart/2005/8/layout/vProcess5"/>
+    <dgm:cxn modelId="{B1B45029-AA98-4B03-88E1-F94AD97BEF60}" type="presOf" srcId="{FB6B08BE-AD91-4253-B4AF-5C63E9751A09}" destId="{A936E2B4-7A8D-4132-8EDD-97395D40254B}" srcOrd="0" destOrd="0" presId="urn:microsoft.com/office/officeart/2005/8/layout/vProcess5"/>
+    <dgm:cxn modelId="{A863B37B-806E-4ED7-8416-75712FBBC31E}" type="presOf" srcId="{E0087C74-CE70-48EC-8808-62858B9B9113}" destId="{8C267F8C-4BE5-4161-A021-BBE9323435CA}" srcOrd="0" destOrd="0" presId="urn:microsoft.com/office/officeart/2005/8/layout/vProcess5"/>
+    <dgm:cxn modelId="{48702F79-9118-4097-B47F-B593EBCAFAB1}" type="presOf" srcId="{C7070F51-E1A0-4D09-9081-A5F494A1B201}" destId="{83712688-FFC8-4A13-82E4-49DA5C155104}" srcOrd="0" destOrd="0" presId="urn:microsoft.com/office/officeart/2005/8/layout/vProcess5"/>
+    <dgm:cxn modelId="{85F5B00D-4480-4C4C-96E6-AFC1C05D1E85}" type="presOf" srcId="{B88792D8-D712-40A7-A01D-408A71AF5FF7}" destId="{E398F807-4385-4BDE-B557-ED460CB4592B}" srcOrd="0" destOrd="0" presId="urn:microsoft.com/office/officeart/2005/8/layout/vProcess5"/>
     <dgm:cxn modelId="{812D9DDF-19AC-4840-AD99-C57B042C91E7}" type="presOf" srcId="{F58A869B-8F8C-4843-B632-03F725FCA3E8}" destId="{0E6A8271-65D0-4356-885C-BB82B18CC538}" srcOrd="1" destOrd="0" presId="urn:microsoft.com/office/officeart/2005/8/layout/vProcess5"/>
     <dgm:cxn modelId="{23C57AF6-BC15-47AF-A852-C1AAD654BEEF}" srcId="{B88792D8-D712-40A7-A01D-408A71AF5FF7}" destId="{FB6B08BE-AD91-4253-B4AF-5C63E9751A09}" srcOrd="0" destOrd="0" parTransId="{3846CA40-7399-4723-853F-E5A7089694F7}" sibTransId="{C7070F51-E1A0-4D09-9081-A5F494A1B201}"/>
-    <dgm:cxn modelId="{48702F79-9118-4097-B47F-B593EBCAFAB1}" type="presOf" srcId="{C7070F51-E1A0-4D09-9081-A5F494A1B201}" destId="{83712688-FFC8-4A13-82E4-49DA5C155104}" srcOrd="0" destOrd="0" presId="urn:microsoft.com/office/officeart/2005/8/layout/vProcess5"/>
-    <dgm:cxn modelId="{70559E97-0754-49B8-A64D-2A0199034E2D}" srcId="{B88792D8-D712-40A7-A01D-408A71AF5FF7}" destId="{F58A869B-8F8C-4843-B632-03F725FCA3E8}" srcOrd="3" destOrd="0" parTransId="{6DAAB895-D3D4-473F-8C79-E680D8D3D636}" sibTransId="{B4FF90E3-B32B-4DFA-B86B-409EA75DB306}"/>
-    <dgm:cxn modelId="{B1B45029-AA98-4B03-88E1-F94AD97BEF60}" type="presOf" srcId="{FB6B08BE-AD91-4253-B4AF-5C63E9751A09}" destId="{A936E2B4-7A8D-4132-8EDD-97395D40254B}" srcOrd="0" destOrd="0" presId="urn:microsoft.com/office/officeart/2005/8/layout/vProcess5"/>
-    <dgm:cxn modelId="{A863B37B-806E-4ED7-8416-75712FBBC31E}" type="presOf" srcId="{E0087C74-CE70-48EC-8808-62858B9B9113}" destId="{8C267F8C-4BE5-4161-A021-BBE9323435CA}" srcOrd="0" destOrd="0" presId="urn:microsoft.com/office/officeart/2005/8/layout/vProcess5"/>
-    <dgm:cxn modelId="{1ECB982F-E1C8-4EAF-9B7E-0443461FB97D}" srcId="{B88792D8-D712-40A7-A01D-408A71AF5FF7}" destId="{73AF2F64-EC1F-4D46-A6E7-57C799028966}" srcOrd="1" destOrd="0" parTransId="{1AE36609-BE59-45D0-BC24-675CCC216EA8}" sibTransId="{1C883D6A-5196-4537-875B-6756E1889799}"/>
-    <dgm:cxn modelId="{85F5B00D-4480-4C4C-96E6-AFC1C05D1E85}" type="presOf" srcId="{B88792D8-D712-40A7-A01D-408A71AF5FF7}" destId="{E398F807-4385-4BDE-B557-ED460CB4592B}" srcOrd="0" destOrd="0" presId="urn:microsoft.com/office/officeart/2005/8/layout/vProcess5"/>
-    <dgm:cxn modelId="{A0027784-114A-4595-B77C-3691776079E6}" type="presOf" srcId="{73AF2F64-EC1F-4D46-A6E7-57C799028966}" destId="{C426A9FE-C2B8-4270-A6AA-B0F2353DA086}" srcOrd="0" destOrd="0" presId="urn:microsoft.com/office/officeart/2005/8/layout/vProcess5"/>
-    <dgm:cxn modelId="{491A86F4-09B3-44D7-BC9F-C7867939E228}" type="presOf" srcId="{F58A869B-8F8C-4843-B632-03F725FCA3E8}" destId="{57AB5A0B-A90F-4138-878C-5261B61BE6CB}" srcOrd="0" destOrd="0" presId="urn:microsoft.com/office/officeart/2005/8/layout/vProcess5"/>
-    <dgm:cxn modelId="{F452DCD4-56D1-44CB-948D-37BD667F7614}" type="presOf" srcId="{1C883D6A-5196-4537-875B-6756E1889799}" destId="{5A282F55-5C46-41ED-B3DE-5FBD8D21CC81}" srcOrd="0" destOrd="0" presId="urn:microsoft.com/office/officeart/2005/8/layout/vProcess5"/>
+    <dgm:cxn modelId="{D9B04089-BF38-4526-B095-A3FB55629E1B}" type="presOf" srcId="{FB6B08BE-AD91-4253-B4AF-5C63E9751A09}" destId="{A3E9B529-827E-4283-8B5C-6588784E1908}" srcOrd="1" destOrd="0" presId="urn:microsoft.com/office/officeart/2005/8/layout/vProcess5"/>
     <dgm:cxn modelId="{B7A52E22-80A4-4C45-8FDA-4D46807B9CCA}" type="presOf" srcId="{1FC7025F-3035-4C50-902C-309F7D7E2063}" destId="{6B2D69F7-A564-4150-BBFF-09440E365314}" srcOrd="0" destOrd="0" presId="urn:microsoft.com/office/officeart/2005/8/layout/vProcess5"/>
     <dgm:cxn modelId="{1F528C1E-9B9A-49E4-80B8-62C3D5C143BC}" type="presOf" srcId="{E0087C74-CE70-48EC-8808-62858B9B9113}" destId="{333B02AC-ED89-4FA0-820B-CA93ECB21864}" srcOrd="1" destOrd="0" presId="urn:microsoft.com/office/officeart/2005/8/layout/vProcess5"/>
-    <dgm:cxn modelId="{3798C650-941A-444C-AC3F-4C71E75ED66D}" srcId="{B88792D8-D712-40A7-A01D-408A71AF5FF7}" destId="{E0087C74-CE70-48EC-8808-62858B9B9113}" srcOrd="2" destOrd="0" parTransId="{ED315333-0BC9-4889-8237-4B2B2091A493}" sibTransId="{1FC7025F-3035-4C50-902C-309F7D7E2063}"/>
-    <dgm:cxn modelId="{D9B04089-BF38-4526-B095-A3FB55629E1B}" type="presOf" srcId="{FB6B08BE-AD91-4253-B4AF-5C63E9751A09}" destId="{A3E9B529-827E-4283-8B5C-6588784E1908}" srcOrd="1" destOrd="0" presId="urn:microsoft.com/office/officeart/2005/8/layout/vProcess5"/>
     <dgm:cxn modelId="{FBD6F502-7B6D-457F-B5CE-444DF178D9C9}" type="presParOf" srcId="{E398F807-4385-4BDE-B557-ED460CB4592B}" destId="{529A7C94-E7D9-4E48-AAC4-D0B7F930C7FE}" srcOrd="0" destOrd="0" presId="urn:microsoft.com/office/officeart/2005/8/layout/vProcess5"/>
     <dgm:cxn modelId="{DEEF522A-D4A8-4CCB-AC76-51A06C46A53F}" type="presParOf" srcId="{E398F807-4385-4BDE-B557-ED460CB4592B}" destId="{A936E2B4-7A8D-4132-8EDD-97395D40254B}" srcOrd="1" destOrd="0" presId="urn:microsoft.com/office/officeart/2005/8/layout/vProcess5"/>
     <dgm:cxn modelId="{B9D86991-A765-422A-B6B9-6E657ED81F61}" type="presParOf" srcId="{E398F807-4385-4BDE-B557-ED460CB4592B}" destId="{C426A9FE-C2B8-4270-A6AA-B0F2353DA086}" srcOrd="2" destOrd="0" presId="urn:microsoft.com/office/officeart/2005/8/layout/vProcess5"/>
@@ -4704,6 +4830,13 @@
         </dgm:presLayoutVars>
       </dgm:prSet>
       <dgm:spPr/>
+      <dgm:t>
+        <a:bodyPr/>
+        <a:lstStyle/>
+        <a:p>
+          <a:endParaRPr lang="en-US"/>
+        </a:p>
+      </dgm:t>
     </dgm:pt>
     <dgm:pt modelId="{8F913411-43C9-4556-B63C-01896181FDC8}" type="pres">
       <dgm:prSet presAssocID="{5E4DB515-5B87-4CDB-B5EF-0352D1AF3C75}" presName="parentText" presStyleLbl="node1" presStyleIdx="0" presStyleCnt="2">
@@ -4713,6 +4846,13 @@
         </dgm:presLayoutVars>
       </dgm:prSet>
       <dgm:spPr/>
+      <dgm:t>
+        <a:bodyPr/>
+        <a:lstStyle/>
+        <a:p>
+          <a:endParaRPr lang="en-US"/>
+        </a:p>
+      </dgm:t>
     </dgm:pt>
     <dgm:pt modelId="{C0EFCC32-55AE-42AD-B8BC-105CE434D2F2}" type="pres">
       <dgm:prSet presAssocID="{5E4DB515-5B87-4CDB-B5EF-0352D1AF3C75}" presName="childText" presStyleLbl="revTx" presStyleIdx="0" presStyleCnt="2">
@@ -4721,6 +4861,13 @@
         </dgm:presLayoutVars>
       </dgm:prSet>
       <dgm:spPr/>
+      <dgm:t>
+        <a:bodyPr/>
+        <a:lstStyle/>
+        <a:p>
+          <a:endParaRPr lang="en-US"/>
+        </a:p>
+      </dgm:t>
     </dgm:pt>
     <dgm:pt modelId="{AECB4257-EC64-42BD-8532-5BFE5787A5F0}" type="pres">
       <dgm:prSet presAssocID="{8F32D2A7-AD15-4DB1-BD2F-1AEED9C68B43}" presName="parentText" presStyleLbl="node1" presStyleIdx="1" presStyleCnt="2">
@@ -44632,6 +44779,84 @@
           </a:p>
         </p:txBody>
       </p:sp>
+      <p:sp>
+        <p:nvSpPr>
+          <p:cNvPr id="3" name="TextBox 2"/>
+          <p:cNvSpPr txBox="1"/>
+          <p:nvPr/>
+        </p:nvSpPr>
+        <p:spPr>
+          <a:xfrm>
+            <a:off x="1828800" y="4781550"/>
+            <a:ext cx="3962400" cy="369332"/>
+          </a:xfrm>
+          <a:prstGeom prst="rect">
+            <a:avLst/>
+          </a:prstGeom>
+          <a:noFill/>
+        </p:spPr>
+        <p:txBody>
+          <a:bodyPr wrap="square" rtlCol="0">
+            <a:spAutoFit/>
+          </a:bodyPr>
+          <a:lstStyle/>
+          <a:p>
+            <a:r>
+              <a:rPr lang="en-US" sz="900" dirty="0" smtClean="0">
+                <a:solidFill>
+                  <a:schemeClr val="bg1"/>
+                </a:solidFill>
+              </a:rPr>
+              <a:t>Data Source: </a:t>
+            </a:r>
+            <a:r>
+              <a:rPr lang="en-US" sz="900" dirty="0" err="1" smtClean="0">
+                <a:solidFill>
+                  <a:schemeClr val="bg1"/>
+                </a:solidFill>
+              </a:rPr>
+              <a:t>SkillCraft-Starcraft</a:t>
+            </a:r>
+            <a:r>
+              <a:rPr lang="en-US" sz="900" dirty="0" smtClean="0">
+                <a:solidFill>
+                  <a:schemeClr val="bg1"/>
+                </a:solidFill>
+              </a:rPr>
+              <a:t> Database on </a:t>
+            </a:r>
+            <a:r>
+              <a:rPr lang="en-US" sz="900" dirty="0" err="1" smtClean="0">
+                <a:solidFill>
+                  <a:schemeClr val="bg1"/>
+                </a:solidFill>
+              </a:rPr>
+              <a:t>Kaggle</a:t>
+            </a:r>
+            <a:r>
+              <a:rPr lang="en-US" sz="900" dirty="0" smtClean="0">
+                <a:solidFill>
+                  <a:schemeClr val="bg1"/>
+                </a:solidFill>
+              </a:rPr>
+              <a:t> </a:t>
+            </a:r>
+            <a:r>
+              <a:rPr lang="en-US" sz="900" dirty="0" smtClean="0">
+                <a:hlinkClick r:id="rId2"/>
+              </a:rPr>
+              <a:t>https</a:t>
+            </a:r>
+            <a:r>
+              <a:rPr lang="en-US" sz="900" dirty="0" smtClean="0">
+                <a:hlinkClick r:id="rId2"/>
+              </a:rPr>
+              <a:t>://www.kaggle.com/danofer/skillcraft/data#SkillCraft.csv</a:t>
+            </a:r>
+            <a:endParaRPr lang="en-US" sz="900" dirty="0"/>
+          </a:p>
+        </p:txBody>
+      </p:sp>
     </p:spTree>
   </p:cSld>
   <p:clrMapOvr>

</xml_diff>

<commit_message>
Update to Notebook and Presentation files.
</commit_message>
<xml_diff>
--- a/ML Classification Presentation.pptx
+++ b/ML Classification Presentation.pptx
@@ -44112,13 +44112,11 @@
           <a:p>
             <a:r>
               <a:rPr lang="en-US" dirty="0" smtClean="0"/>
-              <a:t>Action Latency (Milliseconds between actions)</a:t>
+              <a:t>PAC </a:t>
             </a:r>
-          </a:p>
-          <a:p>
             <a:r>
               <a:rPr lang="en-US" dirty="0" smtClean="0"/>
-              <a:t>PAC (Perception Action Cycle)</a:t>
+              <a:t>(Perception Action Cycle)</a:t>
             </a:r>
           </a:p>
           <a:p>
@@ -44139,8 +44137,35 @@
             <a:pPr lvl="1"/>
             <a:r>
               <a:rPr lang="en-US" dirty="0" smtClean="0"/>
-              <a:t>Average Actions in PAC</a:t>
+              <a:t>Average Actions in </a:t>
             </a:r>
+            <a:r>
+              <a:rPr lang="en-US" dirty="0" smtClean="0"/>
+              <a:t>PAC</a:t>
+            </a:r>
+          </a:p>
+          <a:p>
+            <a:pPr lvl="1"/>
+            <a:r>
+              <a:rPr lang="en-US" dirty="0" smtClean="0"/>
+              <a:t>Action Latency </a:t>
+            </a:r>
+            <a:r>
+              <a:rPr lang="en-US" smtClean="0"/>
+              <a:t>(Milliseconds between </a:t>
+            </a:r>
+            <a:br>
+              <a:rPr lang="en-US" smtClean="0"/>
+            </a:br>
+            <a:r>
+              <a:rPr lang="en-US" smtClean="0"/>
+              <a:t>moving and </a:t>
+            </a:r>
+            <a:r>
+              <a:rPr lang="en-US" dirty="0" smtClean="0"/>
+              <a:t>taking an action)</a:t>
+            </a:r>
+            <a:endParaRPr lang="en-US" dirty="0" smtClean="0"/>
           </a:p>
           <a:p>
             <a:r>
@@ -44845,13 +44870,7 @@
               <a:rPr lang="en-US" sz="900" dirty="0" smtClean="0">
                 <a:hlinkClick r:id="rId2"/>
               </a:rPr>
-              <a:t>https</a:t>
-            </a:r>
-            <a:r>
-              <a:rPr lang="en-US" sz="900" dirty="0" smtClean="0">
-                <a:hlinkClick r:id="rId2"/>
-              </a:rPr>
-              <a:t>://www.kaggle.com/danofer/skillcraft/data#SkillCraft.csv</a:t>
+              <a:t>https://www.kaggle.com/danofer/skillcraft/data#SkillCraft.csv</a:t>
             </a:r>
             <a:endParaRPr lang="en-US" sz="900" dirty="0"/>
           </a:p>

</xml_diff>